<commit_message>
Mise en forme des rapports pour rendu au prof
correspond à la version 0.7. Cette version n'apporte aucune modification
des sources, uniquement de la documentation (rapports et autres)
</commit_message>
<xml_diff>
--- a/doc/Soutenance/Présentation.pptx
+++ b/doc/Soutenance/Présentation.pptx
@@ -282,7 +282,7 @@
           <a:p>
             <a:fld id="{DFF1A6B7-60EF-46F3-9DB9-310FBCAD6932}" type="slidenum">
               <a:rPr lang="fr-FR" smtClean="0"/>
-              <a:t>‹#›</a:t>
+              <a:t>‹N°›</a:t>
             </a:fld>
             <a:endParaRPr lang="fr-FR"/>
           </a:p>
@@ -549,7 +549,7 @@
           <a:p>
             <a:fld id="{073D8618-259F-4DE8-841C-400C26D530B0}" type="slidenum">
               <a:rPr lang="fr-FR" smtClean="0"/>
-              <a:t>‹#›</a:t>
+              <a:t>‹N°›</a:t>
             </a:fld>
             <a:endParaRPr lang="fr-FR"/>
           </a:p>
@@ -2695,7 +2695,7 @@
             <a:fld id="{B6F15528-21DE-4FAA-801E-634DDDAF4B2B}" type="slidenum">
               <a:rPr lang="en-US" smtClean="0"/>
               <a:pPr/>
-              <a:t>‹#›</a:t>
+              <a:t>‹N°›</a:t>
             </a:fld>
             <a:endParaRPr lang="en-US"/>
           </a:p>
@@ -3049,7 +3049,7 @@
             <a:fld id="{B6F15528-21DE-4FAA-801E-634DDDAF4B2B}" type="slidenum">
               <a:rPr lang="en-US" smtClean="0"/>
               <a:pPr/>
-              <a:t>‹#›</a:t>
+              <a:t>‹N°›</a:t>
             </a:fld>
             <a:endParaRPr lang="en-US"/>
           </a:p>
@@ -3229,7 +3229,7 @@
             <a:fld id="{B6F15528-21DE-4FAA-801E-634DDDAF4B2B}" type="slidenum">
               <a:rPr lang="en-US" smtClean="0"/>
               <a:pPr/>
-              <a:t>‹#›</a:t>
+              <a:t>‹N°›</a:t>
             </a:fld>
             <a:endParaRPr lang="en-US"/>
           </a:p>
@@ -3469,7 +3469,7 @@
             <a:fld id="{B6F15528-21DE-4FAA-801E-634DDDAF4B2B}" type="slidenum">
               <a:rPr lang="en-US" smtClean="0"/>
               <a:pPr/>
-              <a:t>‹#›</a:t>
+              <a:t>‹N°›</a:t>
             </a:fld>
             <a:endParaRPr lang="en-US"/>
           </a:p>
@@ -3753,7 +3753,7 @@
             <a:fld id="{B6F15528-21DE-4FAA-801E-634DDDAF4B2B}" type="slidenum">
               <a:rPr lang="en-US" smtClean="0"/>
               <a:pPr/>
-              <a:t>‹#›</a:t>
+              <a:t>‹N°›</a:t>
             </a:fld>
             <a:endParaRPr lang="en-US"/>
           </a:p>
@@ -3968,7 +3968,7 @@
             <a:fld id="{B6F15528-21DE-4FAA-801E-634DDDAF4B2B}" type="slidenum">
               <a:rPr lang="en-US" smtClean="0"/>
               <a:pPr/>
-              <a:t>‹#›</a:t>
+              <a:t>‹N°›</a:t>
             </a:fld>
             <a:endParaRPr lang="en-US"/>
           </a:p>
@@ -4325,7 +4325,7 @@
             <a:fld id="{B6F15528-21DE-4FAA-801E-634DDDAF4B2B}" type="slidenum">
               <a:rPr lang="en-US" smtClean="0"/>
               <a:pPr/>
-              <a:t>‹#›</a:t>
+              <a:t>‹N°›</a:t>
             </a:fld>
             <a:endParaRPr lang="en-US"/>
           </a:p>
@@ -4562,7 +4562,7 @@
             <a:fld id="{B6F15528-21DE-4FAA-801E-634DDDAF4B2B}" type="slidenum">
               <a:rPr lang="en-US" smtClean="0"/>
               <a:pPr/>
-              <a:t>‹#›</a:t>
+              <a:t>‹N°›</a:t>
             </a:fld>
             <a:endParaRPr lang="en-US"/>
           </a:p>
@@ -4707,7 +4707,7 @@
             <a:fld id="{B6F15528-21DE-4FAA-801E-634DDDAF4B2B}" type="slidenum">
               <a:rPr lang="en-US" smtClean="0"/>
               <a:pPr/>
-              <a:t>‹#›</a:t>
+              <a:t>‹N°›</a:t>
             </a:fld>
             <a:endParaRPr lang="en-US"/>
           </a:p>
@@ -4989,7 +4989,7 @@
             <a:fld id="{B6F15528-21DE-4FAA-801E-634DDDAF4B2B}" type="slidenum">
               <a:rPr lang="en-US" smtClean="0"/>
               <a:pPr/>
-              <a:t>‹#›</a:t>
+              <a:t>‹N°›</a:t>
             </a:fld>
             <a:endParaRPr lang="en-US"/>
           </a:p>
@@ -5401,7 +5401,7 @@
             <a:fld id="{B6F15528-21DE-4FAA-801E-634DDDAF4B2B}" type="slidenum">
               <a:rPr lang="en-US" smtClean="0"/>
               <a:pPr/>
-              <a:t>‹#›</a:t>
+              <a:t>‹N°›</a:t>
             </a:fld>
             <a:endParaRPr lang="en-US"/>
           </a:p>
@@ -5776,7 +5776,7 @@
             <a:fld id="{B6F15528-21DE-4FAA-801E-634DDDAF4B2B}" type="slidenum">
               <a:rPr lang="en-US" smtClean="0"/>
               <a:pPr/>
-              <a:t>‹#›</a:t>
+              <a:t>‹N°›</a:t>
             </a:fld>
             <a:endParaRPr lang="en-US"/>
           </a:p>
@@ -6246,7 +6246,7 @@
           <a:blip r:embed="rId2">
             <a:extLst>
               <a:ext uri="{28A0092B-C50C-407E-A947-70E740481C1C}">
-                <a14:useLocalDpi xmlns:a14="http://schemas.microsoft.com/office/drawing/2010/main" val="0"/>
+                <a14:useLocalDpi xmlns:a14="http://schemas.microsoft.com/office/drawing/2010/main"/>
               </a:ext>
             </a:extLst>
           </a:blip>
@@ -6655,7 +6655,7 @@
           <a:blip r:embed="rId3">
             <a:extLst>
               <a:ext uri="{28A0092B-C50C-407E-A947-70E740481C1C}">
-                <a14:useLocalDpi xmlns:a14="http://schemas.microsoft.com/office/drawing/2010/main" val="0"/>
+                <a14:useLocalDpi xmlns:a14="http://schemas.microsoft.com/office/drawing/2010/main"/>
               </a:ext>
             </a:extLst>
           </a:blip>
@@ -6696,7 +6696,7 @@
           <a:blip r:embed="rId4">
             <a:extLst>
               <a:ext uri="{28A0092B-C50C-407E-A947-70E740481C1C}">
-                <a14:useLocalDpi xmlns:a14="http://schemas.microsoft.com/office/drawing/2010/main" val="0"/>
+                <a14:useLocalDpi xmlns:a14="http://schemas.microsoft.com/office/drawing/2010/main"/>
               </a:ext>
             </a:extLst>
           </a:blip>
@@ -6737,7 +6737,7 @@
           <a:blip r:embed="rId5">
             <a:extLst>
               <a:ext uri="{28A0092B-C50C-407E-A947-70E740481C1C}">
-                <a14:useLocalDpi xmlns:a14="http://schemas.microsoft.com/office/drawing/2010/main" val="0"/>
+                <a14:useLocalDpi xmlns:a14="http://schemas.microsoft.com/office/drawing/2010/main"/>
               </a:ext>
             </a:extLst>
           </a:blip>
@@ -6981,10 +6981,10 @@
           <p:nvPr/>
         </p:nvPicPr>
         <p:blipFill>
-          <a:blip r:embed="rId3">
+          <a:blip r:embed="rId3" cstate="screen">
             <a:extLst>
               <a:ext uri="{28A0092B-C50C-407E-A947-70E740481C1C}">
-                <a14:useLocalDpi xmlns:a14="http://schemas.microsoft.com/office/drawing/2010/main" val="0"/>
+                <a14:useLocalDpi xmlns:a14="http://schemas.microsoft.com/office/drawing/2010/main"/>
               </a:ext>
             </a:extLst>
           </a:blip>
@@ -7226,10 +7226,10 @@
           <p:nvPr/>
         </p:nvPicPr>
         <p:blipFill>
-          <a:blip r:embed="rId3">
+          <a:blip r:embed="rId3" cstate="screen">
             <a:extLst>
               <a:ext uri="{28A0092B-C50C-407E-A947-70E740481C1C}">
-                <a14:useLocalDpi xmlns:a14="http://schemas.microsoft.com/office/drawing/2010/main" val="0"/>
+                <a14:useLocalDpi xmlns:a14="http://schemas.microsoft.com/office/drawing/2010/main"/>
               </a:ext>
             </a:extLst>
           </a:blip>
@@ -7483,7 +7483,7 @@
           <a:blip r:embed="rId3">
             <a:extLst>
               <a:ext uri="{28A0092B-C50C-407E-A947-70E740481C1C}">
-                <a14:useLocalDpi xmlns:a14="http://schemas.microsoft.com/office/drawing/2010/main" val="0"/>
+                <a14:useLocalDpi xmlns:a14="http://schemas.microsoft.com/office/drawing/2010/main"/>
               </a:ext>
             </a:extLst>
           </a:blip>
@@ -7649,10 +7649,10 @@
           <p:nvPr/>
         </p:nvPicPr>
         <p:blipFill>
-          <a:blip r:embed="rId2">
+          <a:blip r:embed="rId2" cstate="screen">
             <a:extLst>
               <a:ext uri="{28A0092B-C50C-407E-A947-70E740481C1C}">
-                <a14:useLocalDpi xmlns:a14="http://schemas.microsoft.com/office/drawing/2010/main" val="0"/>
+                <a14:useLocalDpi xmlns:a14="http://schemas.microsoft.com/office/drawing/2010/main"/>
               </a:ext>
             </a:extLst>
           </a:blip>
@@ -7690,10 +7690,10 @@
           <p:nvPr/>
         </p:nvPicPr>
         <p:blipFill>
-          <a:blip r:embed="rId3" cstate="print">
+          <a:blip r:embed="rId3" cstate="screen">
             <a:extLst>
               <a:ext uri="{28A0092B-C50C-407E-A947-70E740481C1C}">
-                <a14:useLocalDpi xmlns:a14="http://schemas.microsoft.com/office/drawing/2010/main" val="0"/>
+                <a14:useLocalDpi xmlns:a14="http://schemas.microsoft.com/office/drawing/2010/main"/>
               </a:ext>
             </a:extLst>
           </a:blip>
@@ -8603,7 +8603,7 @@
           <a:blip r:embed="rId3">
             <a:extLst>
               <a:ext uri="{28A0092B-C50C-407E-A947-70E740481C1C}">
-                <a14:useLocalDpi xmlns:a14="http://schemas.microsoft.com/office/drawing/2010/main" val="0"/>
+                <a14:useLocalDpi xmlns:a14="http://schemas.microsoft.com/office/drawing/2010/main"/>
               </a:ext>
             </a:extLst>
           </a:blip>
@@ -9013,7 +9013,7 @@
           <a:blip r:embed="rId3">
             <a:extLst>
               <a:ext uri="{28A0092B-C50C-407E-A947-70E740481C1C}">
-                <a14:useLocalDpi xmlns:a14="http://schemas.microsoft.com/office/drawing/2010/main" val="0"/>
+                <a14:useLocalDpi xmlns:a14="http://schemas.microsoft.com/office/drawing/2010/main"/>
               </a:ext>
             </a:extLst>
           </a:blip>
@@ -9082,7 +9082,9 @@
           </a:xfrm>
         </p:spPr>
         <p:txBody>
-          <a:bodyPr/>
+          <a:bodyPr>
+            <a:normAutofit lnSpcReduction="10000"/>
+          </a:bodyPr>
           <a:lstStyle/>
           <a:p>
             <a:endParaRPr lang="fr-FR" dirty="0" smtClean="0"/>
@@ -9735,7 +9737,7 @@
           <a:blip r:embed="rId3">
             <a:extLst>
               <a:ext uri="{28A0092B-C50C-407E-A947-70E740481C1C}">
-                <a14:useLocalDpi xmlns:a14="http://schemas.microsoft.com/office/drawing/2010/main" val="0"/>
+                <a14:useLocalDpi xmlns:a14="http://schemas.microsoft.com/office/drawing/2010/main"/>
               </a:ext>
             </a:extLst>
           </a:blip>
@@ -9773,10 +9775,10 @@
           <p:nvPr/>
         </p:nvPicPr>
         <p:blipFill>
-          <a:blip r:embed="rId4">
+          <a:blip r:embed="rId4" cstate="screen">
             <a:extLst>
               <a:ext uri="{28A0092B-C50C-407E-A947-70E740481C1C}">
-                <a14:useLocalDpi xmlns:a14="http://schemas.microsoft.com/office/drawing/2010/main" val="0"/>
+                <a14:useLocalDpi xmlns:a14="http://schemas.microsoft.com/office/drawing/2010/main"/>
               </a:ext>
             </a:extLst>
           </a:blip>
@@ -9817,7 +9819,7 @@
           <a:blip r:embed="rId5">
             <a:extLst>
               <a:ext uri="{28A0092B-C50C-407E-A947-70E740481C1C}">
-                <a14:useLocalDpi xmlns:a14="http://schemas.microsoft.com/office/drawing/2010/main" val="0"/>
+                <a14:useLocalDpi xmlns:a14="http://schemas.microsoft.com/office/drawing/2010/main"/>
               </a:ext>
             </a:extLst>
           </a:blip>
@@ -10114,7 +10116,7 @@
           <a:blip r:embed="rId3">
             <a:extLst>
               <a:ext uri="{28A0092B-C50C-407E-A947-70E740481C1C}">
-                <a14:useLocalDpi xmlns:a14="http://schemas.microsoft.com/office/drawing/2010/main" val="0"/>
+                <a14:useLocalDpi xmlns:a14="http://schemas.microsoft.com/office/drawing/2010/main"/>
               </a:ext>
             </a:extLst>
           </a:blip>

</xml_diff>